<commit_message>
adding session 7 practical solutions and updating session 8 notes
</commit_message>
<xml_diff>
--- a/COM_MScBioinformatics_Session8.pptx
+++ b/COM_MScBioinformatics_Session8.pptx
@@ -7985,7 +7985,7 @@
                           </m:e>
                           <m:e>
                             <m:r>
-                              <m:t>→</m:t>
+                              <m:t>↔</m:t>
                             </m:r>
                           </m:e>
                           <m:e>
@@ -8013,7 +8013,7 @@
                           </m:e>
                           <m:e>
                             <m:r>
-                              <m:t>→</m:t>
+                              <m:t>↔</m:t>
                             </m:r>
                           </m:e>
                           <m:e>
@@ -8041,7 +8041,7 @@
                           </m:e>
                           <m:e>
                             <m:r>
-                              <m:t>→</m:t>
+                              <m:t>↔</m:t>
                             </m:r>
                           </m:e>
                           <m:e>
@@ -8069,7 +8069,7 @@
                           </m:e>
                           <m:e>
                             <m:r>
-                              <m:t>→</m:t>
+                              <m:t>↔</m:t>
                             </m:r>
                           </m:e>
                           <m:e>
@@ -8622,6 +8622,9 @@
                     <m:r>
                       <m:t>=</m:t>
                     </m:r>
+                    <m:r>
+                      <m:t>{</m:t>
+                    </m:r>
                     <m:sSub>
                       <m:e>
                         <m:r>
@@ -8637,6 +8640,9 @@
                         </m:r>
                       </m:sub>
                     </m:sSub>
+                    <m:r>
+                      <m:t>}</m:t>
+                    </m:r>
                   </m:oMath>
                 </a14:m>
                 <a:r>
@@ -9836,13 +9842,16 @@
                     <m:r>
                       <m:t>=</m:t>
                     </m:r>
+                    <m:r>
+                      <m:t>{</m:t>
+                    </m:r>
                     <m:sSub>
                       <m:e>
                         <m:r>
                           <m:rPr>
                             <m:sty m:val="b"/>
                           </m:rPr>
-                          <m:t>X</m:t>
+                          <m:t>x</m:t>
                         </m:r>
                       </m:e>
                       <m:sub>
@@ -9851,6 +9860,9 @@
                         </m:r>
                       </m:sub>
                     </m:sSub>
+                    <m:r>
+                      <m:t>}</m:t>
+                    </m:r>
                   </m:oMath>
                 </a14:m>
                 <a:r>
@@ -10421,7 +10433,7 @@
                 </a:pPr>
                 <a:r>
                   <a:rPr/>
-                  <a:t>Note that mixture models represent a large class of models and have a wide applicability.</a:t>
+                  <a:t>Mixture models are a large class of models and have wide applicability.</a:t>
                 </a:r>
               </a:p>
             </p:txBody>
@@ -10597,7 +10609,7 @@
             </a:pPr>
             <a:r>
               <a:rPr/>
-              <a:t>We will cover 9 key techniques for regression and / or classification:</a:t>
+              <a:t>We will cover 10 key techniques for regression and / or classification:</a:t>
             </a:r>
           </a:p>
           <a:p>
@@ -17046,6 +17058,38 @@
                     <a:hlinkClick r:id="rId2"/>
                   </a:rPr>
                   <a:t>https://www.cs.waikato.ac.nz/ml/weka/</a:t>
+                </a:r>
+              </a:p>
+              <a:p>
+                <a:pPr lvl="0" marL="0" indent="0">
+                  <a:buNone/>
+                </a:pPr>
+                <a14:m>
+                  <m:oMathPara xmlns:m="http://schemas.openxmlformats.org/officeDocument/2006/math">
+                    <m:oMathParaPr>
+                      <m:jc m:val="center"/>
+                    </m:oMathParaPr>
+                    <m:oMath>
+                      <m:r>
+                        <m:t> </m:t>
+                      </m:r>
+                    </m:oMath>
+                  </m:oMathPara>
+                </a14:m>
+              </a:p>
+              <a:p>
+                <a:pPr lvl="0" marL="0" indent="0">
+                  <a:buNone/>
+                </a:pPr>
+                <a:r>
+                  <a:rPr/>
+                  <a:t>TensorFlow: </a:t>
+                </a:r>
+                <a:r>
+                  <a:rPr>
+                    <a:hlinkClick r:id="rId3"/>
+                  </a:rPr>
+                  <a:t>https://www.tensorflow.org/</a:t>
                 </a:r>
               </a:p>
             </p:txBody>

</xml_diff>